<commit_message>
Sprava 3 - not final
</commit_message>
<xml_diff>
--- a/prezentacia.pptx
+++ b/prezentacia.pptx
@@ -2165,82 +2165,67 @@
       </p:grpSpPr>
       <p:sp>
         <p:nvSpPr>
-          <p:cNvPr id="2" name="Nadpis 1"/>
-          <p:cNvSpPr>
-            <a:spLocks noGrp="1"/>
-          </p:cNvSpPr>
-          <p:nvPr>
-            <p:ph type="title"/>
-          </p:nvPr>
-        </p:nvSpPr>
-        <p:spPr/>
+          <p:cNvPr id="3" name="Zástupný symbol textu 2"/>
+          <p:cNvSpPr>
+            <a:spLocks noGrp="1"/>
+          </p:cNvSpPr>
+          <p:nvPr>
+            <p:ph type="body"/>
+          </p:nvPr>
+        </p:nvSpPr>
+        <p:spPr>
+          <a:xfrm>
+            <a:off x="503640" y="1769399"/>
+            <a:ext cx="9068760" cy="5039363"/>
+          </a:xfrm>
+        </p:spPr>
         <p:txBody>
           <a:bodyPr/>
           <a:lstStyle/>
           <a:p>
-            <a:r>
-              <a:rPr lang="sk-SK" dirty="0" smtClean="0"/>
-              <a:t>Riešenie</a:t>
-            </a:r>
-            <a:endParaRPr lang="sk-SK" dirty="0"/>
-          </a:p>
-        </p:txBody>
-      </p:sp>
-      <p:sp>
-        <p:nvSpPr>
-          <p:cNvPr id="3" name="Zástupný symbol textu 2"/>
-          <p:cNvSpPr>
-            <a:spLocks noGrp="1"/>
-          </p:cNvSpPr>
-          <p:nvPr>
-            <p:ph type="body"/>
-          </p:nvPr>
-        </p:nvSpPr>
-        <p:spPr>
-          <a:xfrm>
-            <a:off x="203316" y="1563840"/>
-            <a:ext cx="9369084" cy="5602071"/>
-          </a:xfrm>
-        </p:spPr>
-        <p:txBody>
-          <a:bodyPr/>
-          <a:lstStyle/>
-          <a:p>
-            <a:r>
-              <a:rPr lang="sk-SK" dirty="0" smtClean="0"/>
+            <a:pPr marL="457200" indent="-457200">
+              <a:buFont typeface="Arial" panose="020B0604020202020204" pitchFamily="34" charset="0"/>
+              <a:buChar char="•"/>
+            </a:pPr>
+            <a:r>
+              <a:rPr lang="sk-SK" sz="3200" dirty="0" smtClean="0"/>
               <a:t>Odstránili sme články s </a:t>
             </a:r>
             <a:r>
-              <a:rPr lang="sk-SK" dirty="0" err="1" smtClean="0"/>
+              <a:rPr lang="sk-SK" sz="3200" dirty="0" err="1" smtClean="0"/>
               <a:t>čítanosťou</a:t>
             </a:r>
             <a:r>
-              <a:rPr lang="sk-SK" dirty="0" smtClean="0"/>
+              <a:rPr lang="sk-SK" sz="3200" dirty="0" smtClean="0"/>
               <a:t> nad 10 000            </a:t>
             </a:r>
           </a:p>
           <a:p>
-            <a:pPr lvl="1"/>
+            <a:pPr marL="742950" lvl="8" indent="-285750"/>
             <a:r>
               <a:rPr lang="sk-SK" dirty="0" smtClean="0"/>
               <a:t>141 článkov</a:t>
             </a:r>
           </a:p>
           <a:p>
-            <a:r>
-              <a:rPr lang="sk-SK" dirty="0" smtClean="0"/>
+            <a:pPr marL="457200" indent="-457200">
+              <a:buFont typeface="Arial" panose="020B0604020202020204" pitchFamily="34" charset="0"/>
+              <a:buChar char="•"/>
+            </a:pPr>
+            <a:r>
+              <a:rPr lang="sk-SK" sz="3200" dirty="0" smtClean="0"/>
               <a:t>Zlepšenie výsledkov </a:t>
             </a:r>
           </a:p>
           <a:p>
-            <a:pPr lvl="1"/>
+            <a:pPr marL="742950" lvl="7" indent="-285750"/>
             <a:r>
               <a:rPr lang="sk-SK" dirty="0" smtClean="0"/>
               <a:t>CV predtým =  8,73</a:t>
             </a:r>
           </a:p>
           <a:p>
-            <a:pPr lvl="1"/>
+            <a:pPr marL="742950" lvl="6" indent="-285750"/>
             <a:r>
               <a:rPr lang="sk-SK" dirty="0" smtClean="0"/>
               <a:t>CV potom = 7,7</a:t>
@@ -2248,13 +2233,17 @@
             <a:endParaRPr lang="sk-SK" dirty="0"/>
           </a:p>
           <a:p>
-            <a:r>
-              <a:rPr lang="sk-SK" dirty="0" smtClean="0"/>
+            <a:pPr marL="457200" indent="-457200">
+              <a:buFont typeface="Arial" panose="020B0604020202020204" pitchFamily="34" charset="0"/>
+              <a:buChar char="•"/>
+            </a:pPr>
+            <a:r>
+              <a:rPr lang="sk-SK" sz="3200" dirty="0" smtClean="0"/>
               <a:t>Pridanie nových atribútov do vektoru </a:t>
             </a:r>
           </a:p>
           <a:p>
-            <a:pPr lvl="1"/>
+            <a:pPr marL="742950" lvl="4" indent="-285750"/>
             <a:r>
               <a:rPr lang="sk-SK" dirty="0" smtClean="0"/>
               <a:t>Počet slov (CV </a:t>
@@ -2269,14 +2258,14 @@
             </a:r>
           </a:p>
           <a:p>
-            <a:pPr lvl="1"/>
+            <a:pPr marL="742950" lvl="4" indent="-285750"/>
             <a:r>
               <a:rPr lang="sk-SK" dirty="0" smtClean="0"/>
               <a:t>Kategória (CV = 7,1)</a:t>
             </a:r>
           </a:p>
           <a:p>
-            <a:pPr lvl="1"/>
+            <a:pPr marL="742950" lvl="4" indent="-285750"/>
             <a:r>
               <a:rPr lang="sk-SK" dirty="0" smtClean="0"/>
               <a:t>Sekcia, SME kategória (</a:t>
@@ -2297,27 +2286,31 @@
             </a:r>
           </a:p>
           <a:p>
-            <a:pPr lvl="1"/>
+            <a:pPr marL="742950" lvl="4" indent="-285750"/>
             <a:r>
               <a:rPr lang="sk-SK" dirty="0" smtClean="0"/>
               <a:t>Pridanie času (CV = 7,12)</a:t>
             </a:r>
           </a:p>
           <a:p>
-            <a:r>
-              <a:rPr lang="sk-SK" dirty="0" smtClean="0"/>
+            <a:pPr marL="457200" indent="-457200">
+              <a:buFont typeface="Arial" panose="020B0604020202020204" pitchFamily="34" charset="0"/>
+              <a:buChar char="•"/>
+            </a:pPr>
+            <a:r>
+              <a:rPr lang="sk-SK" sz="3200" dirty="0" smtClean="0"/>
               <a:t>Najlepší výsledok</a:t>
             </a:r>
           </a:p>
           <a:p>
-            <a:pPr lvl="1"/>
+            <a:pPr marL="800100" lvl="3" indent="-342900"/>
             <a:r>
               <a:rPr lang="sk-SK" dirty="0" smtClean="0"/>
               <a:t>Priemerná chyba = 421</a:t>
             </a:r>
           </a:p>
           <a:p>
-            <a:pPr lvl="1"/>
+            <a:pPr marL="800100" lvl="3" indent="-342900"/>
             <a:r>
               <a:rPr lang="sk-SK" dirty="0" smtClean="0"/>
               <a:t>Medián chyby = 68,7</a:t>
@@ -2328,6 +2321,29 @@
               <a:buNone/>
             </a:pPr>
             <a:endParaRPr lang="sk-SK" dirty="0" smtClean="0"/>
+          </a:p>
+        </p:txBody>
+      </p:sp>
+      <p:sp>
+        <p:nvSpPr>
+          <p:cNvPr id="2" name="Nadpis 1"/>
+          <p:cNvSpPr>
+            <a:spLocks noGrp="1"/>
+          </p:cNvSpPr>
+          <p:nvPr>
+            <p:ph type="title"/>
+          </p:nvPr>
+        </p:nvSpPr>
+        <p:spPr/>
+        <p:txBody>
+          <a:bodyPr/>
+          <a:lstStyle/>
+          <a:p>
+            <a:r>
+              <a:rPr lang="sk-SK" dirty="0" smtClean="0"/>
+              <a:t>Riešenie</a:t>
+            </a:r>
+            <a:endParaRPr lang="sk-SK" dirty="0"/>
           </a:p>
         </p:txBody>
       </p:sp>
@@ -2341,6 +2357,13 @@
   <p:clrMapOvr>
     <a:masterClrMapping/>
   </p:clrMapOvr>
+  <p:timing>
+    <p:tnLst>
+      <p:par>
+        <p:cTn id="1" dur="indefinite" restart="never" nodeType="tmRoot"/>
+      </p:par>
+    </p:tnLst>
+  </p:timing>
 </p:sld>
 </file>
 
@@ -2503,6 +2526,152 @@
       </p:grpSpPr>
       <p:sp>
         <p:nvSpPr>
+          <p:cNvPr id="3" name="Podnadpis 2"/>
+          <p:cNvSpPr>
+            <a:spLocks noGrp="1"/>
+          </p:cNvSpPr>
+          <p:nvPr>
+            <p:ph type="body"/>
+          </p:nvPr>
+        </p:nvSpPr>
+        <p:spPr/>
+        <p:txBody>
+          <a:bodyPr/>
+          <a:lstStyle/>
+          <a:p>
+            <a:pPr marL="457200" indent="-457200">
+              <a:buFont typeface="Arial" panose="020B0604020202020204" pitchFamily="34" charset="0"/>
+              <a:buChar char="•"/>
+            </a:pPr>
+            <a:r>
+              <a:rPr lang="sk-SK" sz="3200" dirty="0" smtClean="0">
+                <a:latin typeface="+mn-lt"/>
+              </a:rPr>
+              <a:t>Pridanie nových </a:t>
+            </a:r>
+            <a:r>
+              <a:rPr lang="sk-SK" sz="3200" dirty="0" smtClean="0">
+                <a:latin typeface="+mn-lt"/>
+              </a:rPr>
+              <a:t>atribútov</a:t>
+            </a:r>
+            <a:endParaRPr lang="en-US" sz="3200" dirty="0" smtClean="0">
+              <a:latin typeface="+mn-lt"/>
+            </a:endParaRPr>
+          </a:p>
+          <a:p>
+            <a:pPr marL="171450" lvl="5" indent="-171450">
+              <a:buFont typeface="Arial" panose="020B0604020202020204" pitchFamily="34" charset="0"/>
+              <a:buChar char="•"/>
+            </a:pPr>
+            <a:endParaRPr lang="sk-SK" sz="600" dirty="0" smtClean="0"/>
+          </a:p>
+          <a:p>
+            <a:pPr marL="742950" lvl="2" indent="-285750"/>
+            <a:r>
+              <a:rPr lang="sk-SK" sz="2400" dirty="0">
+                <a:latin typeface="+mn-lt"/>
+              </a:rPr>
+              <a:t>Je uvedený na titulnej strane alebo nie je</a:t>
+            </a:r>
+            <a:r>
+              <a:rPr lang="sk-SK" sz="2400" dirty="0" smtClean="0">
+                <a:latin typeface="+mn-lt"/>
+              </a:rPr>
+              <a:t>?</a:t>
+            </a:r>
+          </a:p>
+          <a:p>
+            <a:pPr marL="742950" lvl="2" indent="-285750"/>
+            <a:r>
+              <a:rPr lang="sk-SK" sz="2400" dirty="0" smtClean="0">
+                <a:latin typeface="+mn-lt"/>
+              </a:rPr>
+              <a:t>Analýza fotografie</a:t>
+            </a:r>
+          </a:p>
+          <a:p>
+            <a:pPr marL="742950" lvl="2" indent="-285750"/>
+            <a:r>
+              <a:rPr lang="sk-SK" sz="2400" dirty="0" smtClean="0">
+                <a:latin typeface="+mn-lt"/>
+              </a:rPr>
+              <a:t>Analýza nadpisu </a:t>
+            </a:r>
+          </a:p>
+          <a:p>
+            <a:pPr marL="742950" lvl="2" indent="-285750"/>
+            <a:r>
+              <a:rPr lang="sk-SK" sz="2400" dirty="0" smtClean="0">
+                <a:latin typeface="+mn-lt"/>
+              </a:rPr>
+              <a:t>Iná metrika popularity</a:t>
+            </a:r>
+          </a:p>
+          <a:p>
+            <a:pPr marL="742950" lvl="2" indent="-285750"/>
+            <a:r>
+              <a:rPr lang="sk-SK" sz="2400" dirty="0" smtClean="0">
+                <a:latin typeface="+mn-lt"/>
+              </a:rPr>
+              <a:t>Presnejšia </a:t>
+            </a:r>
+            <a:r>
+              <a:rPr lang="sk-SK" sz="2400" dirty="0" err="1" smtClean="0">
+                <a:latin typeface="+mn-lt"/>
+              </a:rPr>
+              <a:t>lematizácia</a:t>
+            </a:r>
+            <a:endParaRPr lang="sk-SK" sz="2400" dirty="0">
+              <a:latin typeface="+mn-lt"/>
+            </a:endParaRPr>
+          </a:p>
+          <a:p>
+            <a:pPr marL="742950" lvl="2" indent="-285750"/>
+            <a:r>
+              <a:rPr lang="sk-SK" sz="2400" dirty="0" smtClean="0">
+                <a:latin typeface="+mn-lt"/>
+              </a:rPr>
+              <a:t>Podobnosť slov, </a:t>
+            </a:r>
+            <a:r>
+              <a:rPr lang="sk-SK" sz="2400" dirty="0" err="1" smtClean="0">
+                <a:latin typeface="+mn-lt"/>
+              </a:rPr>
+              <a:t>synonýma</a:t>
+            </a:r>
+            <a:endParaRPr lang="sk-SK" sz="2400" dirty="0" smtClean="0">
+              <a:latin typeface="+mn-lt"/>
+            </a:endParaRPr>
+          </a:p>
+          <a:p>
+            <a:pPr marL="457200" indent="-457200">
+              <a:buFont typeface="Arial" panose="020B0604020202020204" pitchFamily="34" charset="0"/>
+              <a:buChar char="•"/>
+            </a:pPr>
+            <a:r>
+              <a:rPr lang="sk-SK" sz="3200" dirty="0" smtClean="0"/>
+              <a:t>Vyskúšať iné modely</a:t>
+            </a:r>
+          </a:p>
+          <a:p>
+            <a:pPr lvl="1"/>
+            <a:r>
+              <a:rPr lang="sk-SK" dirty="0" smtClean="0"/>
+              <a:t>Iné regresné modely</a:t>
+            </a:r>
+          </a:p>
+          <a:p>
+            <a:pPr lvl="1"/>
+            <a:r>
+              <a:rPr lang="sk-SK" dirty="0" smtClean="0"/>
+              <a:t>Nerúnové siete</a:t>
+            </a:r>
+          </a:p>
+        </p:txBody>
+      </p:sp>
+      <p:sp>
+        <p:nvSpPr>
           <p:cNvPr id="2" name="Nadpis 1"/>
           <p:cNvSpPr>
             <a:spLocks noGrp="1"/>
@@ -2521,109 +2690,6 @@
               <a:t>Čo ďalej</a:t>
             </a:r>
             <a:endParaRPr lang="sk-SK" dirty="0"/>
-          </a:p>
-        </p:txBody>
-      </p:sp>
-      <p:sp>
-        <p:nvSpPr>
-          <p:cNvPr id="3" name="Podnadpis 2"/>
-          <p:cNvSpPr>
-            <a:spLocks noGrp="1"/>
-          </p:cNvSpPr>
-          <p:nvPr>
-            <p:ph type="subTitle"/>
-          </p:nvPr>
-        </p:nvSpPr>
-        <p:spPr>
-          <a:xfrm>
-            <a:off x="503640" y="1495828"/>
-            <a:ext cx="9068760" cy="4370400"/>
-          </a:xfrm>
-        </p:spPr>
-        <p:txBody>
-          <a:bodyPr/>
-          <a:lstStyle/>
-          <a:p>
-            <a:r>
-              <a:rPr lang="sk-SK" dirty="0" smtClean="0"/>
-              <a:t>Pridanie nových atribútov</a:t>
-            </a:r>
-          </a:p>
-          <a:p>
-            <a:pPr lvl="1"/>
-            <a:r>
-              <a:rPr lang="sk-SK" dirty="0"/>
-              <a:t>Je uvedený na titulnej strane alebo nie je</a:t>
-            </a:r>
-            <a:r>
-              <a:rPr lang="sk-SK" dirty="0" smtClean="0"/>
-              <a:t>?</a:t>
-            </a:r>
-          </a:p>
-          <a:p>
-            <a:pPr lvl="1"/>
-            <a:r>
-              <a:rPr lang="sk-SK" dirty="0" smtClean="0"/>
-              <a:t>Analýza fotografie</a:t>
-            </a:r>
-          </a:p>
-          <a:p>
-            <a:pPr lvl="1"/>
-            <a:r>
-              <a:rPr lang="sk-SK" dirty="0" smtClean="0"/>
-              <a:t>Analýza nadpisu </a:t>
-            </a:r>
-          </a:p>
-          <a:p>
-            <a:pPr lvl="1"/>
-            <a:r>
-              <a:rPr lang="sk-SK" dirty="0" smtClean="0"/>
-              <a:t>Iná metrika popularity</a:t>
-            </a:r>
-          </a:p>
-          <a:p>
-            <a:pPr lvl="1"/>
-            <a:r>
-              <a:rPr lang="sk-SK" dirty="0" smtClean="0"/>
-              <a:t>Presnejšia </a:t>
-            </a:r>
-            <a:r>
-              <a:rPr lang="sk-SK" dirty="0" err="1" smtClean="0"/>
-              <a:t>lematizácia</a:t>
-            </a:r>
-            <a:endParaRPr lang="sk-SK" dirty="0"/>
-          </a:p>
-          <a:p>
-            <a:pPr lvl="1"/>
-            <a:r>
-              <a:rPr lang="sk-SK" dirty="0" smtClean="0"/>
-              <a:t>Podobnosť slov, </a:t>
-            </a:r>
-            <a:r>
-              <a:rPr lang="sk-SK" dirty="0" err="1" smtClean="0"/>
-              <a:t>synonýma</a:t>
-            </a:r>
-            <a:endParaRPr lang="sk-SK" dirty="0" smtClean="0"/>
-          </a:p>
-          <a:p>
-            <a:r>
-              <a:rPr lang="sk-SK" dirty="0" smtClean="0"/>
-              <a:t>Vyskúšať iné modely</a:t>
-            </a:r>
-          </a:p>
-          <a:p>
-            <a:pPr lvl="1"/>
-            <a:r>
-              <a:rPr lang="sk-SK" dirty="0" smtClean="0"/>
-              <a:t>Iné regresné modely</a:t>
-            </a:r>
-          </a:p>
-          <a:p>
-            <a:pPr lvl="1"/>
-            <a:r>
-              <a:rPr lang="sk-SK" dirty="0" smtClean="0"/>
-              <a:t>Nerúnové siete</a:t>
-            </a:r>
           </a:p>
         </p:txBody>
       </p:sp>
@@ -2637,6 +2703,13 @@
   <p:clrMapOvr>
     <a:masterClrMapping/>
   </p:clrMapOvr>
+  <p:timing>
+    <p:tnLst>
+      <p:par>
+        <p:cTn id="1" dur="indefinite" restart="never" nodeType="tmRoot"/>
+      </p:par>
+    </p:tnLst>
+  </p:timing>
 </p:sld>
 </file>
 
@@ -2866,25 +2939,13 @@
               <a:t> </a:t>
             </a:r>
             <a:r>
-              <a:rPr lang="en-US" sz="2800" dirty="0" err="1">
-                <a:latin typeface="Arial"/>
-              </a:rPr>
-              <a:t>nie</a:t>
-            </a:r>
-            <a:r>
-              <a:rPr lang="en-US" sz="2800" dirty="0">
-                <a:latin typeface="Arial"/>
-              </a:rPr>
-              <a:t> </a:t>
-            </a:r>
-            <a:r>
-              <a:rPr lang="en-US" sz="2800" dirty="0" err="1">
+              <a:rPr lang="en-US" sz="2800" dirty="0" err="1" smtClean="0">
                 <a:latin typeface="Arial"/>
               </a:rPr>
               <a:t>unikátnych</a:t>
             </a:r>
             <a:r>
-              <a:rPr lang="en-US" sz="2800" dirty="0">
+              <a:rPr lang="en-US" sz="2800" dirty="0" smtClean="0">
                 <a:latin typeface="Arial"/>
               </a:rPr>
               <a:t> </a:t>
@@ -3580,6 +3641,33 @@
       </p:grpSpPr>
       <p:sp>
         <p:nvSpPr>
+          <p:cNvPr id="2" name="Nadpis 1"/>
+          <p:cNvSpPr>
+            <a:spLocks noGrp="1"/>
+          </p:cNvSpPr>
+          <p:nvPr>
+            <p:ph type="title"/>
+          </p:nvPr>
+        </p:nvSpPr>
+        <p:spPr/>
+        <p:txBody>
+          <a:bodyPr/>
+          <a:lstStyle/>
+          <a:p>
+            <a:r>
+              <a:rPr lang="sk-SK" dirty="0"/>
+              <a:t>V</a:t>
+            </a:r>
+            <a:r>
+              <a:rPr lang="sk-SK" dirty="0" smtClean="0"/>
+              <a:t>ýsledky</a:t>
+            </a:r>
+            <a:endParaRPr lang="sk-SK" dirty="0"/>
+          </a:p>
+        </p:txBody>
+      </p:sp>
+      <p:sp>
+        <p:nvSpPr>
           <p:cNvPr id="4" name="Zástupný symbol textu 3"/>
           <p:cNvSpPr>
             <a:spLocks noGrp="1"/>
@@ -3588,22 +3676,21 @@
             <p:ph type="body"/>
           </p:nvPr>
         </p:nvSpPr>
-        <p:spPr>
-          <a:xfrm>
-            <a:off x="503640" y="1563840"/>
-            <a:ext cx="9068760" cy="4385520"/>
-          </a:xfrm>
-        </p:spPr>
+        <p:spPr/>
         <p:txBody>
           <a:bodyPr/>
           <a:lstStyle/>
           <a:p>
-            <a:r>
-              <a:rPr lang="en-US" dirty="0" err="1" smtClean="0"/>
+            <a:pPr marL="457200" indent="-457200">
+              <a:buFont typeface="Arial" panose="020B0604020202020204" pitchFamily="34" charset="0"/>
+              <a:buChar char="•"/>
+            </a:pPr>
+            <a:r>
+              <a:rPr lang="en-US" sz="3200" dirty="0" err="1" smtClean="0"/>
               <a:t>Prv</a:t>
             </a:r>
             <a:r>
-              <a:rPr lang="sk-SK" dirty="0" smtClean="0"/>
+              <a:rPr lang="sk-SK" sz="3200" dirty="0" smtClean="0"/>
               <a:t>ý pokus</a:t>
             </a:r>
           </a:p>
@@ -3671,24 +3758,31 @@
             <a:pPr lvl="1"/>
             <a:r>
               <a:rPr lang="sk-SK" dirty="0" smtClean="0"/>
-              <a:t>Medián = 157</a:t>
-            </a:r>
-            <a:endParaRPr lang="sk-SK" dirty="0"/>
-          </a:p>
-          <a:p>
+              <a:t>Medián = </a:t>
+            </a:r>
             <a:r>
               <a:rPr lang="sk-SK" dirty="0" smtClean="0"/>
+              <a:t>157</a:t>
+            </a:r>
+          </a:p>
+          <a:p>
+            <a:pPr marL="571500" indent="-571500">
+              <a:buFont typeface="Arial" panose="020B0604020202020204" pitchFamily="34" charset="0"/>
+              <a:buChar char="•"/>
+            </a:pPr>
+            <a:r>
+              <a:rPr lang="sk-SK" sz="3200" dirty="0" smtClean="0"/>
               <a:t>Ďalšie pokusy s viac slovami: </a:t>
             </a:r>
           </a:p>
           <a:p>
-            <a:pPr lvl="1"/>
-            <a:r>
-              <a:rPr lang="sk-SK" dirty="0" smtClean="0"/>
+            <a:pPr marL="914400" lvl="2" indent="-457200"/>
+            <a:r>
+              <a:rPr lang="sk-SK" sz="2400" dirty="0" smtClean="0"/>
               <a:t>404, 1079, 1357, </a:t>
             </a:r>
             <a:r>
-              <a:rPr lang="sk-SK" b="1" dirty="0" smtClean="0">
+              <a:rPr lang="sk-SK" sz="2400" b="1" dirty="0" smtClean="0">
                 <a:solidFill>
                   <a:schemeClr val="accent3">
                     <a:lumMod val="50000"/>
@@ -3698,11 +3792,11 @@
               <a:t>2649</a:t>
             </a:r>
             <a:r>
-              <a:rPr lang="sk-SK" b="1" dirty="0" smtClean="0"/>
+              <a:rPr lang="sk-SK" sz="2400" b="1" dirty="0" smtClean="0"/>
               <a:t>,</a:t>
             </a:r>
             <a:r>
-              <a:rPr lang="sk-SK" b="1" dirty="0" smtClean="0">
+              <a:rPr lang="sk-SK" sz="2400" b="1" dirty="0" smtClean="0">
                 <a:solidFill>
                   <a:schemeClr val="accent3"/>
                 </a:solidFill>
@@ -3710,7 +3804,7 @@
               <a:t> </a:t>
             </a:r>
             <a:r>
-              <a:rPr lang="sk-SK" b="1" dirty="0" smtClean="0">
+              <a:rPr lang="sk-SK" sz="2400" b="1" dirty="0" smtClean="0">
                 <a:solidFill>
                   <a:srgbClr val="C00000"/>
                 </a:solidFill>
@@ -3718,7 +3812,15 @@
               <a:t>4056</a:t>
             </a:r>
             <a:r>
-              <a:rPr lang="sk-SK" dirty="0" smtClean="0"/>
+              <a:rPr lang="en-US" sz="2400" b="1" dirty="0" smtClean="0">
+                <a:solidFill>
+                  <a:srgbClr val="C00000"/>
+                </a:solidFill>
+              </a:rPr>
+              <a:t>, 5006</a:t>
+            </a:r>
+            <a:r>
+              <a:rPr lang="sk-SK" sz="2400" dirty="0" smtClean="0"/>
               <a:t> </a:t>
             </a:r>
           </a:p>
@@ -3733,33 +3835,6 @@
               <a:buNone/>
             </a:pPr>
             <a:endParaRPr lang="sk-SK" dirty="0" smtClean="0"/>
-          </a:p>
-        </p:txBody>
-      </p:sp>
-      <p:sp>
-        <p:nvSpPr>
-          <p:cNvPr id="2" name="Nadpis 1"/>
-          <p:cNvSpPr>
-            <a:spLocks noGrp="1"/>
-          </p:cNvSpPr>
-          <p:nvPr>
-            <p:ph type="title"/>
-          </p:nvPr>
-        </p:nvSpPr>
-        <p:spPr/>
-        <p:txBody>
-          <a:bodyPr/>
-          <a:lstStyle/>
-          <a:p>
-            <a:r>
-              <a:rPr lang="sk-SK" dirty="0"/>
-              <a:t>V</a:t>
-            </a:r>
-            <a:r>
-              <a:rPr lang="sk-SK" dirty="0" smtClean="0"/>
-              <a:t>ýsledky</a:t>
-            </a:r>
-            <a:endParaRPr lang="sk-SK" dirty="0"/>
           </a:p>
         </p:txBody>
       </p:sp>
@@ -3823,25 +3898,6 @@
           </a:p>
         </p:txBody>
       </p:sp>
-      <p:sp>
-        <p:nvSpPr>
-          <p:cNvPr id="3" name="Zástupný symbol textu 2"/>
-          <p:cNvSpPr>
-            <a:spLocks noGrp="1"/>
-          </p:cNvSpPr>
-          <p:nvPr>
-            <p:ph type="body"/>
-          </p:nvPr>
-        </p:nvSpPr>
-        <p:spPr/>
-        <p:txBody>
-          <a:bodyPr/>
-          <a:lstStyle/>
-          <a:p>
-            <a:endParaRPr lang="sk-SK" dirty="0"/>
-          </a:p>
-        </p:txBody>
-      </p:sp>
       <p:pic>
         <p:nvPicPr>
           <p:cNvPr id="4" name="Obrázok 3"/>
@@ -3882,6 +3938,13 @@
   <p:clrMapOvr>
     <a:masterClrMapping/>
   </p:clrMapOvr>
+  <p:timing>
+    <p:tnLst>
+      <p:par>
+        <p:cTn id="1" dur="indefinite" restart="never" nodeType="tmRoot"/>
+      </p:par>
+    </p:tnLst>
+  </p:timing>
 </p:sld>
 </file>
 
@@ -3912,7 +3975,12 @@
             <p:ph type="title"/>
           </p:nvPr>
         </p:nvSpPr>
-        <p:spPr/>
+        <p:spPr>
+          <a:xfrm>
+            <a:off x="494820" y="343524"/>
+            <a:ext cx="9068760" cy="1262520"/>
+          </a:xfrm>
+        </p:spPr>
         <p:txBody>
           <a:bodyPr/>
           <a:lstStyle/>
@@ -3921,25 +3989,6 @@
               <a:rPr lang="sk-SK" dirty="0" smtClean="0"/>
               <a:t>Výsledky</a:t>
             </a:r>
-            <a:endParaRPr lang="sk-SK" dirty="0"/>
-          </a:p>
-        </p:txBody>
-      </p:sp>
-      <p:sp>
-        <p:nvSpPr>
-          <p:cNvPr id="3" name="Zástupný symbol textu 2"/>
-          <p:cNvSpPr>
-            <a:spLocks noGrp="1"/>
-          </p:cNvSpPr>
-          <p:nvPr>
-            <p:ph type="body"/>
-          </p:nvPr>
-        </p:nvSpPr>
-        <p:spPr/>
-        <p:txBody>
-          <a:bodyPr/>
-          <a:lstStyle/>
-          <a:p>
             <a:endParaRPr lang="sk-SK" dirty="0"/>
           </a:p>
         </p:txBody>
@@ -3984,6 +4033,13 @@
   <p:clrMapOvr>
     <a:masterClrMapping/>
   </p:clrMapOvr>
+  <p:timing>
+    <p:tnLst>
+      <p:par>
+        <p:cTn id="1" dur="indefinite" restart="never" nodeType="tmRoot"/>
+      </p:par>
+    </p:tnLst>
+  </p:timing>
 </p:sld>
 </file>
 
@@ -4027,25 +4083,6 @@
           </a:p>
         </p:txBody>
       </p:sp>
-      <p:sp>
-        <p:nvSpPr>
-          <p:cNvPr id="3" name="Zástupný symbol textu 2"/>
-          <p:cNvSpPr>
-            <a:spLocks noGrp="1"/>
-          </p:cNvSpPr>
-          <p:nvPr>
-            <p:ph type="body"/>
-          </p:nvPr>
-        </p:nvSpPr>
-        <p:spPr/>
-        <p:txBody>
-          <a:bodyPr/>
-          <a:lstStyle/>
-          <a:p>
-            <a:endParaRPr lang="sk-SK"/>
-          </a:p>
-        </p:txBody>
-      </p:sp>
       <p:pic>
         <p:nvPicPr>
           <p:cNvPr id="4" name="Obrázok 3"/>
@@ -4086,6 +4123,13 @@
   <p:clrMapOvr>
     <a:masterClrMapping/>
   </p:clrMapOvr>
+  <p:timing>
+    <p:tnLst>
+      <p:par>
+        <p:cTn id="1" dur="indefinite" restart="never" nodeType="tmRoot"/>
+      </p:par>
+    </p:tnLst>
+  </p:timing>
 </p:sld>
 </file>
 
@@ -4129,25 +4173,6 @@
           </a:p>
         </p:txBody>
       </p:sp>
-      <p:sp>
-        <p:nvSpPr>
-          <p:cNvPr id="3" name="Zástupný symbol textu 2"/>
-          <p:cNvSpPr>
-            <a:spLocks noGrp="1"/>
-          </p:cNvSpPr>
-          <p:nvPr>
-            <p:ph type="body"/>
-          </p:nvPr>
-        </p:nvSpPr>
-        <p:spPr/>
-        <p:txBody>
-          <a:bodyPr/>
-          <a:lstStyle/>
-          <a:p>
-            <a:endParaRPr lang="sk-SK"/>
-          </a:p>
-        </p:txBody>
-      </p:sp>
       <p:pic>
         <p:nvPicPr>
           <p:cNvPr id="4" name="Obrázok 3"/>
@@ -4188,6 +4213,13 @@
   <p:clrMapOvr>
     <a:masterClrMapping/>
   </p:clrMapOvr>
+  <p:timing>
+    <p:tnLst>
+      <p:par>
+        <p:cTn id="1" dur="indefinite" restart="never" nodeType="tmRoot"/>
+      </p:par>
+    </p:tnLst>
+  </p:timing>
 </p:sld>
 </file>
 

</xml_diff>